<commit_message>
modified gitignore to ignore glove file
</commit_message>
<xml_diff>
--- a/Poster.pptx
+++ b/Poster.pptx
@@ -104,6 +104,11 @@
       </a:defRPr>
     </a:lvl9pPr>
   </p:defaultTextStyle>
+  <p:extLst>
+    <p:ext uri="{EFAFB233-063F-42B5-8137-9DF3F51BA10A}">
+      <p15:sldGuideLst xmlns:p15="http://schemas.microsoft.com/office/powerpoint/2012/main"/>
+    </p:ext>
+  </p:extLst>
 </p:presentation>
 </file>
 
@@ -238,7 +243,7 @@
           <a:p>
             <a:fld id="{20B76EFC-CAEE-4F74-AEE7-09B606295E47}" type="datetimeFigureOut">
               <a:rPr lang="en-US" smtClean="0"/>
-              <a:t>11/26/2016</a:t>
+              <a:t>11/30/2016</a:t>
             </a:fld>
             <a:endParaRPr lang="en-US"/>
           </a:p>
@@ -408,7 +413,7 @@
           <a:p>
             <a:fld id="{20B76EFC-CAEE-4F74-AEE7-09B606295E47}" type="datetimeFigureOut">
               <a:rPr lang="en-US" smtClean="0"/>
-              <a:t>11/26/2016</a:t>
+              <a:t>11/30/2016</a:t>
             </a:fld>
             <a:endParaRPr lang="en-US"/>
           </a:p>
@@ -588,7 +593,7 @@
           <a:p>
             <a:fld id="{20B76EFC-CAEE-4F74-AEE7-09B606295E47}" type="datetimeFigureOut">
               <a:rPr lang="en-US" smtClean="0"/>
-              <a:t>11/26/2016</a:t>
+              <a:t>11/30/2016</a:t>
             </a:fld>
             <a:endParaRPr lang="en-US"/>
           </a:p>
@@ -758,7 +763,7 @@
           <a:p>
             <a:fld id="{20B76EFC-CAEE-4F74-AEE7-09B606295E47}" type="datetimeFigureOut">
               <a:rPr lang="en-US" smtClean="0"/>
-              <a:t>11/26/2016</a:t>
+              <a:t>11/30/2016</a:t>
             </a:fld>
             <a:endParaRPr lang="en-US"/>
           </a:p>
@@ -1002,7 +1007,7 @@
           <a:p>
             <a:fld id="{20B76EFC-CAEE-4F74-AEE7-09B606295E47}" type="datetimeFigureOut">
               <a:rPr lang="en-US" smtClean="0"/>
-              <a:t>11/26/2016</a:t>
+              <a:t>11/30/2016</a:t>
             </a:fld>
             <a:endParaRPr lang="en-US"/>
           </a:p>
@@ -1234,7 +1239,7 @@
           <a:p>
             <a:fld id="{20B76EFC-CAEE-4F74-AEE7-09B606295E47}" type="datetimeFigureOut">
               <a:rPr lang="en-US" smtClean="0"/>
-              <a:t>11/26/2016</a:t>
+              <a:t>11/30/2016</a:t>
             </a:fld>
             <a:endParaRPr lang="en-US"/>
           </a:p>
@@ -1601,7 +1606,7 @@
           <a:p>
             <a:fld id="{20B76EFC-CAEE-4F74-AEE7-09B606295E47}" type="datetimeFigureOut">
               <a:rPr lang="en-US" smtClean="0"/>
-              <a:t>11/26/2016</a:t>
+              <a:t>11/30/2016</a:t>
             </a:fld>
             <a:endParaRPr lang="en-US"/>
           </a:p>
@@ -1719,7 +1724,7 @@
           <a:p>
             <a:fld id="{20B76EFC-CAEE-4F74-AEE7-09B606295E47}" type="datetimeFigureOut">
               <a:rPr lang="en-US" smtClean="0"/>
-              <a:t>11/26/2016</a:t>
+              <a:t>11/30/2016</a:t>
             </a:fld>
             <a:endParaRPr lang="en-US"/>
           </a:p>
@@ -1814,7 +1819,7 @@
           <a:p>
             <a:fld id="{20B76EFC-CAEE-4F74-AEE7-09B606295E47}" type="datetimeFigureOut">
               <a:rPr lang="en-US" smtClean="0"/>
-              <a:t>11/26/2016</a:t>
+              <a:t>11/30/2016</a:t>
             </a:fld>
             <a:endParaRPr lang="en-US"/>
           </a:p>
@@ -2091,7 +2096,7 @@
           <a:p>
             <a:fld id="{20B76EFC-CAEE-4F74-AEE7-09B606295E47}" type="datetimeFigureOut">
               <a:rPr lang="en-US" smtClean="0"/>
-              <a:t>11/26/2016</a:t>
+              <a:t>11/30/2016</a:t>
             </a:fld>
             <a:endParaRPr lang="en-US"/>
           </a:p>
@@ -2348,7 +2353,7 @@
           <a:p>
             <a:fld id="{20B76EFC-CAEE-4F74-AEE7-09B606295E47}" type="datetimeFigureOut">
               <a:rPr lang="en-US" smtClean="0"/>
-              <a:t>11/26/2016</a:t>
+              <a:t>11/30/2016</a:t>
             </a:fld>
             <a:endParaRPr lang="en-US"/>
           </a:p>
@@ -2561,7 +2566,7 @@
           <a:p>
             <a:fld id="{20B76EFC-CAEE-4F74-AEE7-09B606295E47}" type="datetimeFigureOut">
               <a:rPr lang="en-US" smtClean="0"/>
-              <a:t>11/26/2016</a:t>
+              <a:t>11/30/2016</a:t>
             </a:fld>
             <a:endParaRPr lang="en-US"/>
           </a:p>
@@ -2974,7 +2979,7 @@
         </p:nvSpPr>
         <p:spPr>
           <a:xfrm>
-            <a:off x="66040" y="769317"/>
+            <a:off x="66040" y="357837"/>
             <a:ext cx="42016680" cy="1446550"/>
           </a:xfrm>
           <a:prstGeom prst="rect">
@@ -2991,11 +2996,11 @@
             <a:pPr algn="ctr"/>
             <a:r>
               <a:rPr lang="en-US" sz="8800" dirty="0"/>
-              <a:t>Word Sense Induction and Disambiguation Using Context </a:t>
+              <a:t>Extracting sense vectors from word </a:t>
             </a:r>
             <a:r>
               <a:rPr lang="en-US" sz="8800" dirty="0" err="1"/>
-              <a:t>Embeddings</a:t>
+              <a:t>embeddings</a:t>
             </a:r>
             <a:endParaRPr lang="en-US" sz="1000" dirty="0"/>
           </a:p>
@@ -3101,7 +3106,7 @@
         <p:spPr>
           <a:xfrm>
             <a:off x="457200" y="3453233"/>
-            <a:ext cx="7315200" cy="26684228"/>
+            <a:ext cx="14904720" cy="7478970"/>
           </a:xfrm>
           <a:prstGeom prst="rect">
             <a:avLst/>
@@ -3131,162 +3136,6 @@
             <a:r>
               <a:rPr lang="en-US" sz="4800" dirty="0"/>
               <a:t>ABSTRACT/INTRO</a:t>
-            </a:r>
-          </a:p>
-          <a:p>
-            <a:r>
-              <a:rPr lang="en-US" sz="4800" dirty="0"/>
-              <a:t>INTRO TEXT HERE</a:t>
-            </a:r>
-          </a:p>
-          <a:p>
-            <a:r>
-              <a:rPr lang="en-US" sz="4800" dirty="0"/>
-              <a:t>INTRO TEXT HERE</a:t>
-            </a:r>
-          </a:p>
-          <a:p>
-            <a:r>
-              <a:rPr lang="en-US" sz="4800" dirty="0"/>
-              <a:t>INTRO TEXT HERE</a:t>
-            </a:r>
-          </a:p>
-          <a:p>
-            <a:r>
-              <a:rPr lang="en-US" sz="4800" dirty="0"/>
-              <a:t>INTRO TEXT HERE</a:t>
-            </a:r>
-          </a:p>
-          <a:p>
-            <a:r>
-              <a:rPr lang="en-US" sz="4800" dirty="0"/>
-              <a:t>INTRO TEXT HERE</a:t>
-            </a:r>
-          </a:p>
-          <a:p>
-            <a:r>
-              <a:rPr lang="en-US" sz="4800" dirty="0"/>
-              <a:t>INTRO TEXT HERE</a:t>
-            </a:r>
-          </a:p>
-          <a:p>
-            <a:r>
-              <a:rPr lang="en-US" sz="4800" dirty="0"/>
-              <a:t>INTRO TEXT HERE</a:t>
-            </a:r>
-          </a:p>
-          <a:p>
-            <a:r>
-              <a:rPr lang="en-US" sz="4800" dirty="0"/>
-              <a:t>INTRO TEXT HERE</a:t>
-            </a:r>
-          </a:p>
-          <a:p>
-            <a:r>
-              <a:rPr lang="en-US" sz="4800" dirty="0"/>
-              <a:t>INTRO TEXT HERE</a:t>
-            </a:r>
-          </a:p>
-          <a:p>
-            <a:r>
-              <a:rPr lang="en-US" sz="4800" dirty="0"/>
-              <a:t>INTRO TEXT HERE</a:t>
-            </a:r>
-          </a:p>
-          <a:p>
-            <a:r>
-              <a:rPr lang="en-US" sz="4800" dirty="0"/>
-              <a:t>INTRO TEXT HERE</a:t>
-            </a:r>
-          </a:p>
-          <a:p>
-            <a:r>
-              <a:rPr lang="en-US" sz="4800" dirty="0"/>
-              <a:t>INTRO TEXT HERE</a:t>
-            </a:r>
-          </a:p>
-          <a:p>
-            <a:r>
-              <a:rPr lang="en-US" sz="4800" dirty="0"/>
-              <a:t>INTRO TEXT HERE</a:t>
-            </a:r>
-          </a:p>
-          <a:p>
-            <a:r>
-              <a:rPr lang="en-US" sz="4800" dirty="0"/>
-              <a:t>INTRO TEXT HERE</a:t>
-            </a:r>
-          </a:p>
-          <a:p>
-            <a:r>
-              <a:rPr lang="en-US" sz="4800" dirty="0"/>
-              <a:t>INTRO TEXT HERE</a:t>
-            </a:r>
-          </a:p>
-          <a:p>
-            <a:r>
-              <a:rPr lang="en-US" sz="4800" dirty="0"/>
-              <a:t>INTRO TEXT HERE</a:t>
-            </a:r>
-          </a:p>
-          <a:p>
-            <a:r>
-              <a:rPr lang="en-US" sz="4800" dirty="0"/>
-              <a:t>INTRO TEXT HERE</a:t>
-            </a:r>
-          </a:p>
-          <a:p>
-            <a:r>
-              <a:rPr lang="en-US" sz="4800" dirty="0"/>
-              <a:t>INTRO TEXT HERE</a:t>
-            </a:r>
-          </a:p>
-          <a:p>
-            <a:r>
-              <a:rPr lang="en-US" sz="4800" dirty="0"/>
-              <a:t>INTRO TEXT HERE</a:t>
-            </a:r>
-          </a:p>
-          <a:p>
-            <a:r>
-              <a:rPr lang="en-US" sz="4800" dirty="0"/>
-              <a:t>INTRO TEXT HERE</a:t>
-            </a:r>
-          </a:p>
-          <a:p>
-            <a:r>
-              <a:rPr lang="en-US" sz="4800" dirty="0"/>
-              <a:t>INTRO TEXT HERE</a:t>
-            </a:r>
-          </a:p>
-          <a:p>
-            <a:r>
-              <a:rPr lang="en-US" sz="4800" dirty="0"/>
-              <a:t>INTRO TEXT HERE</a:t>
-            </a:r>
-          </a:p>
-          <a:p>
-            <a:r>
-              <a:rPr lang="en-US" sz="4800" dirty="0"/>
-              <a:t>INTRO TEXT HERE</a:t>
-            </a:r>
-          </a:p>
-          <a:p>
-            <a:r>
-              <a:rPr lang="en-US" sz="4800" dirty="0"/>
-              <a:t>INTRO TEXT HERE</a:t>
-            </a:r>
-          </a:p>
-          <a:p>
-            <a:r>
-              <a:rPr lang="en-US" sz="4800" dirty="0"/>
-              <a:t>INTRO TEXT HERE</a:t>
-            </a:r>
-          </a:p>
-          <a:p>
-            <a:r>
-              <a:rPr lang="en-US" sz="4800" dirty="0"/>
-              <a:t>INTRO TEXT HERE</a:t>
             </a:r>
           </a:p>
           <a:p>
@@ -3413,8 +3262,8 @@
         </p:nvSpPr>
         <p:spPr>
           <a:xfrm>
-            <a:off x="8077200" y="3401266"/>
-            <a:ext cx="23114000" cy="16342935"/>
+            <a:off x="15824199" y="3494689"/>
+            <a:ext cx="27338495" cy="17081599"/>
           </a:xfrm>
           <a:prstGeom prst="rect">
             <a:avLst/>
@@ -3444,6 +3293,29 @@
             <a:r>
               <a:rPr lang="en-US" sz="4800" dirty="0"/>
               <a:t>MAIN RESULTS/TABLES</a:t>
+            </a:r>
+          </a:p>
+          <a:p>
+            <a:pPr algn="ctr"/>
+            <a:r>
+              <a:rPr lang="en-US" sz="4800" dirty="0"/>
+              <a:t>Describe results of 4 </a:t>
+            </a:r>
+            <a:r>
+              <a:rPr lang="en-US" sz="4800" dirty="0" err="1"/>
+              <a:t>algos</a:t>
+            </a:r>
+            <a:r>
+              <a:rPr lang="en-US" sz="4800" dirty="0"/>
+              <a:t> (</a:t>
+            </a:r>
+            <a:r>
+              <a:rPr lang="en-US" sz="4800" dirty="0" err="1"/>
+              <a:t>GLoVe</a:t>
+            </a:r>
+            <a:r>
+              <a:rPr lang="en-US" sz="4800" dirty="0"/>
+              <a:t>, Arora, ICE)</a:t>
             </a:r>
           </a:p>
           <a:p>
@@ -3697,8 +3569,8 @@
         </p:nvSpPr>
         <p:spPr>
           <a:xfrm>
-            <a:off x="31496000" y="3402433"/>
-            <a:ext cx="12039600" cy="16342935"/>
+            <a:off x="457200" y="11348411"/>
+            <a:ext cx="14904720" cy="19297590"/>
           </a:xfrm>
           <a:prstGeom prst="rect">
             <a:avLst/>
@@ -3731,6 +3603,29 @@
             </a:r>
           </a:p>
           <a:p>
+            <a:pPr algn="ctr"/>
+            <a:endParaRPr lang="en-US" sz="4800" dirty="0"/>
+          </a:p>
+          <a:p>
+            <a:pPr algn="ctr"/>
+            <a:r>
+              <a:rPr lang="en-US" sz="4800" dirty="0"/>
+              <a:t>Describe Arora paper and ICE</a:t>
+            </a:r>
+          </a:p>
+          <a:p>
+            <a:r>
+              <a:rPr lang="en-US" sz="4800" dirty="0"/>
+              <a:t>TEXT HERE</a:t>
+            </a:r>
+          </a:p>
+          <a:p>
+            <a:r>
+              <a:rPr lang="en-US" sz="4800" dirty="0"/>
+              <a:t>TEXT HERE</a:t>
+            </a:r>
+          </a:p>
+          <a:p>
             <a:r>
               <a:rPr lang="en-US" sz="4800" dirty="0"/>
               <a:t>TEXT HERE</a:t>
@@ -3866,8 +3761,8 @@
         </p:nvSpPr>
         <p:spPr>
           <a:xfrm>
-            <a:off x="8077200" y="20299499"/>
-            <a:ext cx="23114000" cy="9694962"/>
+            <a:off x="15824198" y="20299499"/>
+            <a:ext cx="15367001" cy="9694962"/>
           </a:xfrm>
           <a:prstGeom prst="rect">
             <a:avLst/>
@@ -3970,6 +3865,64 @@
               <a:rPr lang="en-US" sz="4800" dirty="0"/>
               <a:t>TEXT HERE</a:t>
             </a:r>
+          </a:p>
+        </p:txBody>
+      </p:sp>
+      <p:sp>
+        <p:nvSpPr>
+          <p:cNvPr id="2" name="TextBox 1"/>
+          <p:cNvSpPr txBox="1"/>
+          <p:nvPr/>
+        </p:nvSpPr>
+        <p:spPr>
+          <a:xfrm>
+            <a:off x="12125007" y="1853893"/>
+            <a:ext cx="17898746" cy="923330"/>
+          </a:xfrm>
+          <a:prstGeom prst="rect">
+            <a:avLst/>
+          </a:prstGeom>
+          <a:noFill/>
+        </p:spPr>
+        <p:txBody>
+          <a:bodyPr wrap="none" rtlCol="0">
+            <a:spAutoFit/>
+          </a:bodyPr>
+          <a:lstStyle/>
+          <a:p>
+            <a:r>
+              <a:rPr lang="en-US" sz="5400" dirty="0" err="1"/>
+              <a:t>Devandra</a:t>
+            </a:r>
+            <a:r>
+              <a:rPr lang="en-US" sz="5400" dirty="0"/>
+              <a:t> </a:t>
+            </a:r>
+            <a:r>
+              <a:rPr lang="en-US" sz="5400" dirty="0" err="1"/>
+              <a:t>Sachan</a:t>
+            </a:r>
+            <a:r>
+              <a:rPr lang="en-US" sz="5400" dirty="0"/>
+              <a:t>, Easwaran Ramamurthy, </a:t>
+            </a:r>
+            <a:r>
+              <a:rPr lang="en-US" sz="5400" dirty="0" err="1"/>
+              <a:t>Tejus</a:t>
+            </a:r>
+            <a:r>
+              <a:rPr lang="en-US" sz="5400" dirty="0"/>
+              <a:t> </a:t>
+            </a:r>
+            <a:r>
+              <a:rPr lang="en-US" sz="5400" dirty="0" err="1"/>
+              <a:t>Siddagangaiah</a:t>
+            </a:r>
+            <a:r>
+              <a:rPr lang="en-US" sz="5400" dirty="0"/>
+              <a:t> </a:t>
+            </a:r>
+            <a:endParaRPr lang="en-US" sz="1600" dirty="0"/>
           </a:p>
         </p:txBody>
       </p:sp>

</xml_diff>

<commit_message>
modified gitignore. Abstract added in poster
</commit_message>
<xml_diff>
--- a/Poster.pptx
+++ b/Poster.pptx
@@ -3105,8 +3105,8 @@
         </p:nvSpPr>
         <p:spPr>
           <a:xfrm>
-            <a:off x="457200" y="3453233"/>
-            <a:ext cx="14904720" cy="7478970"/>
+            <a:off x="546573" y="3470903"/>
+            <a:ext cx="14904720" cy="7602081"/>
           </a:xfrm>
           <a:prstGeom prst="rect">
             <a:avLst/>
@@ -3135,61 +3135,45 @@
             <a:pPr algn="ctr"/>
             <a:r>
               <a:rPr lang="en-US" sz="4800" dirty="0"/>
-              <a:t>ABSTRACT/INTRO</a:t>
-            </a:r>
-          </a:p>
-          <a:p>
-            <a:r>
-              <a:rPr lang="en-US" sz="4800" dirty="0"/>
-              <a:t>INTRO TEXT HERE</a:t>
-            </a:r>
-          </a:p>
-          <a:p>
-            <a:r>
-              <a:rPr lang="en-US" sz="4800" dirty="0"/>
-              <a:t>INTRO TEXT HERE</a:t>
-            </a:r>
-          </a:p>
-          <a:p>
-            <a:r>
-              <a:rPr lang="en-US" sz="4800" dirty="0"/>
-              <a:t>INTRO TEXT HERE</a:t>
-            </a:r>
-          </a:p>
-          <a:p>
-            <a:r>
-              <a:rPr lang="en-US" sz="4800" dirty="0"/>
-              <a:t>INTRO TEXT HERE</a:t>
-            </a:r>
-          </a:p>
-          <a:p>
-            <a:r>
-              <a:rPr lang="en-US" sz="4800" dirty="0"/>
-              <a:t>INTRO TEXT HERE</a:t>
-            </a:r>
-          </a:p>
-          <a:p>
-            <a:r>
-              <a:rPr lang="en-US" sz="4800" dirty="0"/>
-              <a:t>INTRO TEXT HERE</a:t>
-            </a:r>
-          </a:p>
-          <a:p>
-            <a:r>
-              <a:rPr lang="en-US" sz="4800" dirty="0"/>
-              <a:t>INTRO TEXT HERE</a:t>
-            </a:r>
-          </a:p>
-          <a:p>
-            <a:r>
-              <a:rPr lang="en-US" sz="4800" dirty="0"/>
-              <a:t>INTRO TEXT HERE</a:t>
-            </a:r>
-          </a:p>
-          <a:p>
-            <a:r>
-              <a:rPr lang="en-US" sz="4800" dirty="0"/>
-              <a:t>INTRO TEXT HERE</a:t>
+              <a:t>ABSTRACT</a:t>
+            </a:r>
+          </a:p>
+          <a:p>
+            <a:r>
+              <a:rPr lang="en-US" sz="4000" dirty="0"/>
+              <a:t>Vector Space Models (VSMs) represent words as dense, real-valued vectors in an embedding space where semantically and syntactically similar words are closer to each other.  However, one notable deficiency in these methods is that they cannot capture multiple senses of each word, thereby ignoring </a:t>
+            </a:r>
+            <a:r>
+              <a:rPr lang="en-US" sz="4000" dirty="0" err="1"/>
+              <a:t>polysemes</a:t>
+            </a:r>
+            <a:r>
+              <a:rPr lang="en-US" sz="4000" dirty="0"/>
+              <a:t> and homonyms. Recent methods such as ICE (instance-context </a:t>
+            </a:r>
+            <a:r>
+              <a:rPr lang="en-US" sz="4000" dirty="0" err="1"/>
+              <a:t>embeddings</a:t>
+            </a:r>
+            <a:r>
+              <a:rPr lang="en-US" sz="4000" dirty="0"/>
+              <a:t>)[1] and a sparse coding based method [2] have sought to overcome this problem. Our work focuses on first evaluating these methods and doing a comparative study followed by a proposal to develop an alternative method that learn context </a:t>
+            </a:r>
+            <a:r>
+              <a:rPr lang="en-US" sz="4000" dirty="0" err="1"/>
+              <a:t>embeddings</a:t>
+            </a:r>
+            <a:r>
+              <a:rPr lang="en-US" sz="4000" dirty="0"/>
+              <a:t> for words using ____ </a:t>
+            </a:r>
+            <a:r>
+              <a:rPr lang="en-US" sz="4000" b="1" dirty="0">
+                <a:solidFill>
+                  <a:srgbClr val="FF0000"/>
+                </a:solidFill>
+              </a:rPr>
+              <a:t>(DEVENDRA please fill in)</a:t>
             </a:r>
           </a:p>
         </p:txBody>
@@ -3202,8 +3186,8 @@
         </p:nvSpPr>
         <p:spPr>
           <a:xfrm>
-            <a:off x="457200" y="30410669"/>
-            <a:ext cx="43078400" cy="2308324"/>
+            <a:off x="457200" y="30916505"/>
+            <a:ext cx="43078400" cy="1815882"/>
           </a:xfrm>
           <a:prstGeom prst="rect">
             <a:avLst/>
@@ -3237,19 +3221,85 @@
           <a:p>
             <a:r>
               <a:rPr lang="en-US" sz="3200" dirty="0"/>
-              <a:t>REFERENCE 1</a:t>
-            </a:r>
-          </a:p>
-          <a:p>
+              <a:t>1. Mikael </a:t>
+            </a:r>
+            <a:r>
+              <a:rPr lang="en-US" sz="3200" dirty="0" err="1"/>
+              <a:t>Kågebäck</a:t>
+            </a:r>
             <a:r>
               <a:rPr lang="en-US" sz="3200" dirty="0"/>
-              <a:t>REFERENCE 2</a:t>
-            </a:r>
-          </a:p>
-          <a:p>
+              <a:t>, Fredrik Johansson, Richard Johansson, and </a:t>
+            </a:r>
+            <a:r>
+              <a:rPr lang="en-US" sz="3200" dirty="0" err="1"/>
+              <a:t>Devdatt</a:t>
+            </a:r>
             <a:r>
               <a:rPr lang="en-US" sz="3200" dirty="0"/>
-              <a:t>REFERENCE 3</a:t>
+              <a:t> </a:t>
+            </a:r>
+            <a:r>
+              <a:rPr lang="en-US" sz="3200" dirty="0" err="1"/>
+              <a:t>Dubhashi</a:t>
+            </a:r>
+            <a:r>
+              <a:rPr lang="en-US" sz="3200" dirty="0"/>
+              <a:t>.   Neural context </a:t>
+            </a:r>
+            <a:r>
+              <a:rPr lang="en-US" sz="3200" dirty="0" err="1"/>
+              <a:t>embeddings</a:t>
+            </a:r>
+            <a:r>
+              <a:rPr lang="en-US" sz="3200" dirty="0"/>
+              <a:t> for automatic discovery of word senses. In Proceedings of NAACL-HLT, pages 25–32, 2015</a:t>
+            </a:r>
+          </a:p>
+          <a:p>
+            <a:r>
+              <a:rPr lang="en-US" sz="3200" dirty="0"/>
+              <a:t>2. Sanjeev Arora, </a:t>
+            </a:r>
+            <a:r>
+              <a:rPr lang="en-US" sz="3200" dirty="0" err="1"/>
+              <a:t>Yuanzhi</a:t>
+            </a:r>
+            <a:r>
+              <a:rPr lang="en-US" sz="3200" dirty="0"/>
+              <a:t> Li, </a:t>
+            </a:r>
+            <a:r>
+              <a:rPr lang="en-US" sz="3200" dirty="0" err="1"/>
+              <a:t>Yingyu</a:t>
+            </a:r>
+            <a:r>
+              <a:rPr lang="en-US" sz="3200" dirty="0"/>
+              <a:t> Liang, </a:t>
+            </a:r>
+            <a:r>
+              <a:rPr lang="en-US" sz="3200" dirty="0" err="1"/>
+              <a:t>Tengyu</a:t>
+            </a:r>
+            <a:r>
+              <a:rPr lang="en-US" sz="3200" dirty="0"/>
+              <a:t> Ma, and Andrej </a:t>
+            </a:r>
+            <a:r>
+              <a:rPr lang="en-US" sz="3200" dirty="0" err="1"/>
+              <a:t>Risteski</a:t>
+            </a:r>
+            <a:r>
+              <a:rPr lang="en-US" sz="3200" dirty="0"/>
+              <a:t>. Linear algebraic structure of word senses, with applications to polysemy. </a:t>
+            </a:r>
+            <a:r>
+              <a:rPr lang="en-US" sz="3200" dirty="0" err="1"/>
+              <a:t>arXiv</a:t>
+            </a:r>
+            <a:r>
+              <a:rPr lang="en-US" sz="3200" dirty="0"/>
+              <a:t> preprint arXiv:1601.03764,2016.</a:t>
             </a:r>
           </a:p>
         </p:txBody>
@@ -3569,8 +3619,8 @@
         </p:nvSpPr>
         <p:spPr>
           <a:xfrm>
-            <a:off x="457200" y="11348411"/>
-            <a:ext cx="14904720" cy="19297590"/>
+            <a:off x="457199" y="12196185"/>
+            <a:ext cx="14904720" cy="14865608"/>
           </a:xfrm>
           <a:prstGeom prst="rect">
             <a:avLst/>
@@ -3611,42 +3661,6 @@
             <a:r>
               <a:rPr lang="en-US" sz="4800" dirty="0"/>
               <a:t>Describe Arora paper and ICE</a:t>
-            </a:r>
-          </a:p>
-          <a:p>
-            <a:r>
-              <a:rPr lang="en-US" sz="4800" dirty="0"/>
-              <a:t>TEXT HERE</a:t>
-            </a:r>
-          </a:p>
-          <a:p>
-            <a:r>
-              <a:rPr lang="en-US" sz="4800" dirty="0"/>
-              <a:t>TEXT HERE</a:t>
-            </a:r>
-          </a:p>
-          <a:p>
-            <a:r>
-              <a:rPr lang="en-US" sz="4800" dirty="0"/>
-              <a:t>TEXT HERE</a:t>
-            </a:r>
-          </a:p>
-          <a:p>
-            <a:r>
-              <a:rPr lang="en-US" sz="4800" dirty="0"/>
-              <a:t>TEXT HERE</a:t>
-            </a:r>
-          </a:p>
-          <a:p>
-            <a:r>
-              <a:rPr lang="en-US" sz="4800" dirty="0"/>
-              <a:t>TEXT HERE</a:t>
-            </a:r>
-          </a:p>
-          <a:p>
-            <a:r>
-              <a:rPr lang="en-US" sz="4800" dirty="0"/>
-              <a:t>TEXT HERE</a:t>
             </a:r>
           </a:p>
           <a:p>

</xml_diff>

<commit_message>
added figure to poster
</commit_message>
<xml_diff>
--- a/Poster.pptx
+++ b/Poster.pptx
@@ -3186,8 +3186,8 @@
         </p:nvSpPr>
         <p:spPr>
           <a:xfrm>
-            <a:off x="457200" y="30916505"/>
-            <a:ext cx="43078400" cy="1815882"/>
+            <a:off x="15824198" y="30013795"/>
+            <a:ext cx="27711402" cy="2800767"/>
           </a:xfrm>
           <a:prstGeom prst="rect">
             <a:avLst/>
@@ -3313,7 +3313,7 @@
         <p:spPr>
           <a:xfrm>
             <a:off x="15824199" y="3494689"/>
-            <a:ext cx="27338495" cy="17081599"/>
+            <a:ext cx="27711401" cy="17081599"/>
           </a:xfrm>
           <a:prstGeom prst="rect">
             <a:avLst/>
@@ -3619,8 +3619,8 @@
         </p:nvSpPr>
         <p:spPr>
           <a:xfrm>
-            <a:off x="457199" y="12196185"/>
-            <a:ext cx="14904720" cy="14865608"/>
+            <a:off x="457200" y="22321623"/>
+            <a:ext cx="14904720" cy="6001643"/>
           </a:xfrm>
           <a:prstGeom prst="rect">
             <a:avLst/>
@@ -3649,85 +3649,12 @@
             <a:pPr algn="ctr"/>
             <a:r>
               <a:rPr lang="en-US" sz="4800" dirty="0"/>
-              <a:t>MORE RESULTS/TABLE?</a:t>
+              <a:t>SPARSE CODING</a:t>
             </a:r>
           </a:p>
           <a:p>
             <a:pPr algn="ctr"/>
             <a:endParaRPr lang="en-US" sz="4800" dirty="0"/>
-          </a:p>
-          <a:p>
-            <a:pPr algn="ctr"/>
-            <a:r>
-              <a:rPr lang="en-US" sz="4800" dirty="0"/>
-              <a:t>Describe Arora paper and ICE</a:t>
-            </a:r>
-          </a:p>
-          <a:p>
-            <a:r>
-              <a:rPr lang="en-US" sz="4800" dirty="0"/>
-              <a:t>TEXT HERE</a:t>
-            </a:r>
-          </a:p>
-          <a:p>
-            <a:r>
-              <a:rPr lang="en-US" sz="4800" dirty="0"/>
-              <a:t>TEXT HERE</a:t>
-            </a:r>
-          </a:p>
-          <a:p>
-            <a:r>
-              <a:rPr lang="en-US" sz="4800" dirty="0"/>
-              <a:t>TEXT HERE</a:t>
-            </a:r>
-          </a:p>
-          <a:p>
-            <a:r>
-              <a:rPr lang="en-US" sz="4800" dirty="0"/>
-              <a:t>TEXT HERE</a:t>
-            </a:r>
-          </a:p>
-          <a:p>
-            <a:r>
-              <a:rPr lang="en-US" sz="4800" dirty="0"/>
-              <a:t>TEXT HERE</a:t>
-            </a:r>
-          </a:p>
-          <a:p>
-            <a:r>
-              <a:rPr lang="en-US" sz="4800" dirty="0"/>
-              <a:t>TEXT HERE</a:t>
-            </a:r>
-          </a:p>
-          <a:p>
-            <a:r>
-              <a:rPr lang="en-US" sz="4800" dirty="0"/>
-              <a:t>TEXT HERE</a:t>
-            </a:r>
-          </a:p>
-          <a:p>
-            <a:r>
-              <a:rPr lang="en-US" sz="4800" dirty="0"/>
-              <a:t>TEXT HERE</a:t>
-            </a:r>
-          </a:p>
-          <a:p>
-            <a:r>
-              <a:rPr lang="en-US" sz="4800" dirty="0"/>
-              <a:t>TEXT HERE</a:t>
-            </a:r>
-          </a:p>
-          <a:p>
-            <a:r>
-              <a:rPr lang="en-US" sz="4800" dirty="0"/>
-              <a:t>TEXT HERE</a:t>
-            </a:r>
-          </a:p>
-          <a:p>
-            <a:r>
-              <a:rPr lang="en-US" sz="4800" dirty="0"/>
-              <a:t>TEXT HERE</a:t>
-            </a:r>
           </a:p>
           <a:p>
             <a:r>
@@ -3940,6 +3867,41 @@
           </a:p>
         </p:txBody>
       </p:sp>
+      <p:pic>
+        <p:nvPicPr>
+          <p:cNvPr id="18" name="Picture 17"/>
+          <p:cNvPicPr>
+            <a:picLocks noChangeAspect="1"/>
+          </p:cNvPicPr>
+          <p:nvPr/>
+        </p:nvPicPr>
+        <p:blipFill>
+          <a:blip r:embed="rId4">
+            <a:extLst>
+              <a:ext uri="{28A0092B-C50C-407E-A947-70E740481C1C}">
+                <a14:useLocalDpi xmlns:a14="http://schemas.microsoft.com/office/drawing/2010/main" val="0"/>
+              </a:ext>
+            </a:extLst>
+          </a:blip>
+          <a:stretch>
+            <a:fillRect/>
+          </a:stretch>
+        </p:blipFill>
+        <p:spPr>
+          <a:xfrm>
+            <a:off x="546572" y="11354948"/>
+            <a:ext cx="14972825" cy="10458605"/>
+          </a:xfrm>
+          <a:prstGeom prst="rect">
+            <a:avLst/>
+          </a:prstGeom>
+          <a:ln w="12700">
+            <a:solidFill>
+              <a:schemeClr val="tx1"/>
+            </a:solidFill>
+          </a:ln>
+        </p:spPr>
+      </p:pic>
     </p:spTree>
     <p:extLst>
       <p:ext uri="{BB962C8B-B14F-4D97-AF65-F5344CB8AC3E}">

</xml_diff>